<commit_message>
Added ability to add books, added ability to open books in pdf viewer
</commit_message>
<xml_diff>
--- a/Präsentation1.pptx
+++ b/Präsentation1.pptx
@@ -113,7 +113,7 @@
   </p:defaultTextStyle>
   <p:extLst>
     <p:ext uri="{EFAFB233-063F-42B5-8137-9DF3F51BA10A}">
-      <p15:sldGuideLst xmlns:p15="http://schemas.microsoft.com/office/powerpoint/2012/main"/>
+      <p15:sldGuideLst xmlns:p15="http://schemas.microsoft.com/office/powerpoint/2012/main" xmlns=""/>
     </p:ext>
   </p:extLst>
 </p:presentation>
@@ -250,7 +250,7 @@
           <a:p>
             <a:fld id="{2C35BDDB-0E19-47B1-B7AE-6C1020E12004}" type="datetimeFigureOut">
               <a:rPr lang="de-CH" smtClean="0"/>
-              <a:t>27.03.2015</a:t>
+              <a:t>27/03/15</a:t>
             </a:fld>
             <a:endParaRPr lang="de-CH"/>
           </a:p>
@@ -292,7 +292,7 @@
           <a:p>
             <a:fld id="{AE65BCEC-B365-46D6-8ADD-9A43E69F09F1}" type="slidenum">
               <a:rPr lang="de-CH" smtClean="0"/>
-              <a:t>‹Nr.›</a:t>
+              <a:t>‹#›</a:t>
             </a:fld>
             <a:endParaRPr lang="de-CH"/>
           </a:p>
@@ -420,7 +420,7 @@
           <a:p>
             <a:fld id="{2C35BDDB-0E19-47B1-B7AE-6C1020E12004}" type="datetimeFigureOut">
               <a:rPr lang="de-CH" smtClean="0"/>
-              <a:t>27.03.2015</a:t>
+              <a:t>27/03/15</a:t>
             </a:fld>
             <a:endParaRPr lang="de-CH"/>
           </a:p>
@@ -462,7 +462,7 @@
           <a:p>
             <a:fld id="{AE65BCEC-B365-46D6-8ADD-9A43E69F09F1}" type="slidenum">
               <a:rPr lang="de-CH" smtClean="0"/>
-              <a:t>‹Nr.›</a:t>
+              <a:t>‹#›</a:t>
             </a:fld>
             <a:endParaRPr lang="de-CH"/>
           </a:p>
@@ -600,7 +600,7 @@
           <a:p>
             <a:fld id="{2C35BDDB-0E19-47B1-B7AE-6C1020E12004}" type="datetimeFigureOut">
               <a:rPr lang="de-CH" smtClean="0"/>
-              <a:t>27.03.2015</a:t>
+              <a:t>27/03/15</a:t>
             </a:fld>
             <a:endParaRPr lang="de-CH"/>
           </a:p>
@@ -642,7 +642,7 @@
           <a:p>
             <a:fld id="{AE65BCEC-B365-46D6-8ADD-9A43E69F09F1}" type="slidenum">
               <a:rPr lang="de-CH" smtClean="0"/>
-              <a:t>‹Nr.›</a:t>
+              <a:t>‹#›</a:t>
             </a:fld>
             <a:endParaRPr lang="de-CH"/>
           </a:p>
@@ -770,7 +770,7 @@
           <a:p>
             <a:fld id="{2C35BDDB-0E19-47B1-B7AE-6C1020E12004}" type="datetimeFigureOut">
               <a:rPr lang="de-CH" smtClean="0"/>
-              <a:t>27.03.2015</a:t>
+              <a:t>27/03/15</a:t>
             </a:fld>
             <a:endParaRPr lang="de-CH"/>
           </a:p>
@@ -812,7 +812,7 @@
           <a:p>
             <a:fld id="{AE65BCEC-B365-46D6-8ADD-9A43E69F09F1}" type="slidenum">
               <a:rPr lang="de-CH" smtClean="0"/>
-              <a:t>‹Nr.›</a:t>
+              <a:t>‹#›</a:t>
             </a:fld>
             <a:endParaRPr lang="de-CH"/>
           </a:p>
@@ -1016,7 +1016,7 @@
           <a:p>
             <a:fld id="{2C35BDDB-0E19-47B1-B7AE-6C1020E12004}" type="datetimeFigureOut">
               <a:rPr lang="de-CH" smtClean="0"/>
-              <a:t>27.03.2015</a:t>
+              <a:t>27/03/15</a:t>
             </a:fld>
             <a:endParaRPr lang="de-CH"/>
           </a:p>
@@ -1058,7 +1058,7 @@
           <a:p>
             <a:fld id="{AE65BCEC-B365-46D6-8ADD-9A43E69F09F1}" type="slidenum">
               <a:rPr lang="de-CH" smtClean="0"/>
-              <a:t>‹Nr.›</a:t>
+              <a:t>‹#›</a:t>
             </a:fld>
             <a:endParaRPr lang="de-CH"/>
           </a:p>
@@ -1248,7 +1248,7 @@
           <a:p>
             <a:fld id="{2C35BDDB-0E19-47B1-B7AE-6C1020E12004}" type="datetimeFigureOut">
               <a:rPr lang="de-CH" smtClean="0"/>
-              <a:t>27.03.2015</a:t>
+              <a:t>27/03/15</a:t>
             </a:fld>
             <a:endParaRPr lang="de-CH"/>
           </a:p>
@@ -1290,7 +1290,7 @@
           <a:p>
             <a:fld id="{AE65BCEC-B365-46D6-8ADD-9A43E69F09F1}" type="slidenum">
               <a:rPr lang="de-CH" smtClean="0"/>
-              <a:t>‹Nr.›</a:t>
+              <a:t>‹#›</a:t>
             </a:fld>
             <a:endParaRPr lang="de-CH"/>
           </a:p>
@@ -1615,7 +1615,7 @@
           <a:p>
             <a:fld id="{2C35BDDB-0E19-47B1-B7AE-6C1020E12004}" type="datetimeFigureOut">
               <a:rPr lang="de-CH" smtClean="0"/>
-              <a:t>27.03.2015</a:t>
+              <a:t>27/03/15</a:t>
             </a:fld>
             <a:endParaRPr lang="de-CH"/>
           </a:p>
@@ -1657,7 +1657,7 @@
           <a:p>
             <a:fld id="{AE65BCEC-B365-46D6-8ADD-9A43E69F09F1}" type="slidenum">
               <a:rPr lang="de-CH" smtClean="0"/>
-              <a:t>‹Nr.›</a:t>
+              <a:t>‹#›</a:t>
             </a:fld>
             <a:endParaRPr lang="de-CH"/>
           </a:p>
@@ -1733,7 +1733,7 @@
           <a:p>
             <a:fld id="{2C35BDDB-0E19-47B1-B7AE-6C1020E12004}" type="datetimeFigureOut">
               <a:rPr lang="de-CH" smtClean="0"/>
-              <a:t>27.03.2015</a:t>
+              <a:t>27/03/15</a:t>
             </a:fld>
             <a:endParaRPr lang="de-CH"/>
           </a:p>
@@ -1775,7 +1775,7 @@
           <a:p>
             <a:fld id="{AE65BCEC-B365-46D6-8ADD-9A43E69F09F1}" type="slidenum">
               <a:rPr lang="de-CH" smtClean="0"/>
-              <a:t>‹Nr.›</a:t>
+              <a:t>‹#›</a:t>
             </a:fld>
             <a:endParaRPr lang="de-CH"/>
           </a:p>
@@ -1828,7 +1828,7 @@
           <a:p>
             <a:fld id="{2C35BDDB-0E19-47B1-B7AE-6C1020E12004}" type="datetimeFigureOut">
               <a:rPr lang="de-CH" smtClean="0"/>
-              <a:t>27.03.2015</a:t>
+              <a:t>27/03/15</a:t>
             </a:fld>
             <a:endParaRPr lang="de-CH"/>
           </a:p>
@@ -1870,7 +1870,7 @@
           <a:p>
             <a:fld id="{AE65BCEC-B365-46D6-8ADD-9A43E69F09F1}" type="slidenum">
               <a:rPr lang="de-CH" smtClean="0"/>
-              <a:t>‹Nr.›</a:t>
+              <a:t>‹#›</a:t>
             </a:fld>
             <a:endParaRPr lang="de-CH"/>
           </a:p>
@@ -2105,7 +2105,7 @@
           <a:p>
             <a:fld id="{2C35BDDB-0E19-47B1-B7AE-6C1020E12004}" type="datetimeFigureOut">
               <a:rPr lang="de-CH" smtClean="0"/>
-              <a:t>27.03.2015</a:t>
+              <a:t>27/03/15</a:t>
             </a:fld>
             <a:endParaRPr lang="de-CH"/>
           </a:p>
@@ -2147,7 +2147,7 @@
           <a:p>
             <a:fld id="{AE65BCEC-B365-46D6-8ADD-9A43E69F09F1}" type="slidenum">
               <a:rPr lang="de-CH" smtClean="0"/>
-              <a:t>‹Nr.›</a:t>
+              <a:t>‹#›</a:t>
             </a:fld>
             <a:endParaRPr lang="de-CH"/>
           </a:p>
@@ -2358,7 +2358,7 @@
           <a:p>
             <a:fld id="{2C35BDDB-0E19-47B1-B7AE-6C1020E12004}" type="datetimeFigureOut">
               <a:rPr lang="de-CH" smtClean="0"/>
-              <a:t>27.03.2015</a:t>
+              <a:t>27/03/15</a:t>
             </a:fld>
             <a:endParaRPr lang="de-CH"/>
           </a:p>
@@ -2400,7 +2400,7 @@
           <a:p>
             <a:fld id="{AE65BCEC-B365-46D6-8ADD-9A43E69F09F1}" type="slidenum">
               <a:rPr lang="de-CH" smtClean="0"/>
-              <a:t>‹Nr.›</a:t>
+              <a:t>‹#›</a:t>
             </a:fld>
             <a:endParaRPr lang="de-CH"/>
           </a:p>
@@ -2571,7 +2571,7 @@
           <a:p>
             <a:fld id="{2C35BDDB-0E19-47B1-B7AE-6C1020E12004}" type="datetimeFigureOut">
               <a:rPr lang="de-CH" smtClean="0"/>
-              <a:t>27.03.2015</a:t>
+              <a:t>27/03/15</a:t>
             </a:fld>
             <a:endParaRPr lang="de-CH"/>
           </a:p>
@@ -2649,7 +2649,7 @@
           <a:p>
             <a:fld id="{AE65BCEC-B365-46D6-8ADD-9A43E69F09F1}" type="slidenum">
               <a:rPr lang="de-CH" smtClean="0"/>
-              <a:t>‹Nr.›</a:t>
+              <a:t>‹#›</a:t>
             </a:fld>
             <a:endParaRPr lang="de-CH"/>
           </a:p>
@@ -3023,15 +3023,52 @@
             </a:pPr>
             <a:r>
               <a:rPr lang="en-GB" noProof="1" smtClean="0"/>
-              <a:t>Browse, explore, find, read, borrow, </a:t>
+              <a:t>Browse, explore, find, read, borrow, bookmark and annotate books</a:t>
             </a:r>
             <a:r>
               <a:rPr lang="en-GB" noProof="1" smtClean="0"/>
-              <a:t>bookmark </a:t>
-            </a:r>
+              <a:t>.</a:t>
+            </a:r>
+          </a:p>
+          <a:p>
+            <a:pPr marL="0" indent="0">
+              <a:buNone/>
+            </a:pPr>
+            <a:endParaRPr lang="en-GB" noProof="1"/>
+          </a:p>
+          <a:p>
+            <a:pPr marL="0" indent="0">
+              <a:buNone/>
+            </a:pPr>
             <a:r>
               <a:rPr lang="en-GB" noProof="1" smtClean="0"/>
-              <a:t>and annotate books.</a:t>
+              <a:t>Rapha</a:t>
+            </a:r>
+            <a:r>
+              <a:rPr lang="en-GB" noProof="1" smtClean="0"/>
+              <a:t>ë</a:t>
+            </a:r>
+            <a:r>
+              <a:rPr lang="en-GB" noProof="1" smtClean="0"/>
+              <a:t>l Tuor</a:t>
+            </a:r>
+          </a:p>
+          <a:p>
+            <a:pPr marL="0" indent="0">
+              <a:buNone/>
+            </a:pPr>
+            <a:r>
+              <a:rPr lang="en-GB" noProof="1" smtClean="0"/>
+              <a:t>Christoph Reinhart</a:t>
+            </a:r>
+          </a:p>
+          <a:p>
+            <a:pPr marL="0" indent="0">
+              <a:buNone/>
+            </a:pPr>
+            <a:r>
+              <a:rPr lang="en-GB" noProof="1" smtClean="0"/>
+              <a:t>Nicolas Spycher</a:t>
             </a:r>
             <a:endParaRPr lang="en-GB" noProof="1"/>
           </a:p>
@@ -3050,7 +3087,7 @@
   <p:timing>
     <p:tnLst>
       <p:par>
-        <p:cTn id="1" dur="indefinite" restart="never" nodeType="tmRoot"/>
+        <p:cTn xmlns:p14="http://schemas.microsoft.com/office/powerpoint/2010/main" id="1" dur="indefinite" restart="never" nodeType="tmRoot"/>
       </p:par>
     </p:tnLst>
   </p:timing>
@@ -3128,11 +3165,7 @@
             </a:pPr>
             <a:r>
               <a:rPr lang="en-US" dirty="0" smtClean="0"/>
-              <a:t>	- 2 Modalities: Speech &amp; </a:t>
-            </a:r>
-            <a:r>
-              <a:rPr lang="en-US" dirty="0" smtClean="0"/>
-              <a:t>Gestures </a:t>
+              <a:t>	- 2 Modalities: Speech &amp; Gestures </a:t>
             </a:r>
           </a:p>
           <a:p>
@@ -3253,7 +3286,7 @@
   <p:timing>
     <p:tnLst>
       <p:par>
-        <p:cTn id="1" dur="indefinite" restart="never" nodeType="tmRoot"/>
+        <p:cTn xmlns:p14="http://schemas.microsoft.com/office/powerpoint/2010/main" id="1" dur="indefinite" restart="never" nodeType="tmRoot"/>
       </p:par>
     </p:tnLst>
   </p:timing>
@@ -3333,7 +3366,7 @@
           </a:prstGeom>
           <a:noFill/>
           <a:extLst>
-            <a:ext uri="{909E8E84-426E-40DD-AFC4-6F175D3DCCD1}">
+            <a:ext uri="{909E8E84-426E-40dd-AFC4-6F175D3DCCD1}">
               <a14:hiddenFill xmlns:a14="http://schemas.microsoft.com/office/drawing/2010/main">
                 <a:solidFill>
                   <a:srgbClr val="FFFFFF"/>
@@ -3402,7 +3435,7 @@
   <p:timing>
     <p:tnLst>
       <p:par>
-        <p:cTn id="1" dur="indefinite" restart="never" nodeType="tmRoot">
+        <p:cTn xmlns:p14="http://schemas.microsoft.com/office/powerpoint/2010/main" id="1" dur="indefinite" restart="never" nodeType="tmRoot">
           <p:childTnLst>
             <p:seq concurrent="1" nextAc="seek">
               <p:cTn id="2" dur="indefinite" nodeType="mainSeq">
@@ -3595,7 +3628,7 @@
   <p:timing>
     <p:tnLst>
       <p:par>
-        <p:cTn id="1" dur="indefinite" restart="never" nodeType="tmRoot"/>
+        <p:cTn xmlns:p14="http://schemas.microsoft.com/office/powerpoint/2010/main" id="1" dur="indefinite" restart="never" nodeType="tmRoot"/>
       </p:par>
     </p:tnLst>
   </p:timing>
@@ -3727,7 +3760,7 @@
   <p:timing>
     <p:tnLst>
       <p:par>
-        <p:cTn id="1" dur="indefinite" restart="never" nodeType="tmRoot"/>
+        <p:cTn xmlns:p14="http://schemas.microsoft.com/office/powerpoint/2010/main" id="1" dur="indefinite" restart="never" nodeType="tmRoot"/>
       </p:par>
     </p:tnLst>
   </p:timing>
@@ -3825,8 +3858,13 @@
             </a:pPr>
             <a:r>
               <a:rPr lang="en-GB" dirty="0" smtClean="0"/>
-              <a:t>Equivalent / Redundant ???</a:t>
-            </a:r>
+              <a:t>Equivalent / </a:t>
+            </a:r>
+            <a:r>
+              <a:rPr lang="en-GB" dirty="0" smtClean="0"/>
+              <a:t>Redundant</a:t>
+            </a:r>
+            <a:endParaRPr lang="en-GB" dirty="0" smtClean="0"/>
           </a:p>
           <a:p>
             <a:pPr lvl="1">
@@ -3880,7 +3918,7 @@
   <p:timing>
     <p:tnLst>
       <p:par>
-        <p:cTn id="1" dur="indefinite" restart="never" nodeType="tmRoot"/>
+        <p:cTn xmlns:p14="http://schemas.microsoft.com/office/powerpoint/2010/main" id="1" dur="indefinite" restart="never" nodeType="tmRoot"/>
       </p:par>
     </p:tnLst>
   </p:timing>
@@ -3982,7 +4020,7 @@
   <p:timing>
     <p:tnLst>
       <p:par>
-        <p:cTn id="1" dur="indefinite" restart="never" nodeType="tmRoot"/>
+        <p:cTn xmlns:p14="http://schemas.microsoft.com/office/powerpoint/2010/main" id="1" dur="indefinite" restart="never" nodeType="tmRoot"/>
       </p:par>
     </p:tnLst>
   </p:timing>
@@ -4042,7 +4080,7 @@
         <p:spPr/>
         <p:txBody>
           <a:bodyPr>
-            <a:normAutofit/>
+            <a:normAutofit lnSpcReduction="10000"/>
           </a:bodyPr>
           <a:lstStyle/>
           <a:p>
@@ -4051,11 +4089,7 @@
             </a:pPr>
             <a:r>
               <a:rPr lang="en-US" dirty="0" smtClean="0"/>
-              <a:t>Can progressive interfaces enhance the experience and the productivity of an user compared to an interface  he is already accustomed to</a:t>
-            </a:r>
-            <a:r>
-              <a:rPr lang="en-US" dirty="0" smtClean="0"/>
-              <a:t>?</a:t>
+              <a:t>Can progressive interfaces enhance the experience and the productivity of an user compared to an interface  he is already accustomed to?</a:t>
             </a:r>
           </a:p>
           <a:p>
@@ -4092,11 +4126,7 @@
             </a:pPr>
             <a:r>
               <a:rPr lang="en-US" dirty="0"/>
-              <a:t>	</a:t>
-            </a:r>
-            <a:r>
-              <a:rPr lang="en-US" dirty="0"/>
-              <a:t> </a:t>
+              <a:t>	 </a:t>
             </a:r>
             <a:r>
               <a:rPr lang="en-US" dirty="0" smtClean="0"/>
@@ -4113,11 +4143,7 @@
             </a:r>
             <a:r>
               <a:rPr lang="en-US" dirty="0" smtClean="0"/>
-              <a:t>- Compare the time with each modality. Test on differen</a:t>
-            </a:r>
-            <a:r>
-              <a:rPr lang="en-US" dirty="0" smtClean="0"/>
-              <a:t>t kinds of 	   users</a:t>
+              <a:t>- Compare the time with each modality. Test on different kinds of 	   users</a:t>
             </a:r>
           </a:p>
           <a:p>
@@ -4160,7 +4186,7 @@
   <p:timing>
     <p:tnLst>
       <p:par>
-        <p:cTn id="1" dur="indefinite" restart="never" nodeType="tmRoot"/>
+        <p:cTn xmlns:p14="http://schemas.microsoft.com/office/powerpoint/2010/main" id="1" dur="indefinite" restart="never" nodeType="tmRoot"/>
       </p:par>
     </p:tnLst>
   </p:timing>
@@ -4210,7 +4236,7 @@
     </a:clrScheme>
     <a:fontScheme name="Office">
       <a:majorFont>
-        <a:latin typeface="Calibri Light" panose="020F0302020204030204"/>
+        <a:latin typeface="Calibri Light"/>
         <a:ea typeface=""/>
         <a:cs typeface=""/>
         <a:font script="Jpan" typeface="ＭＳ Ｐゴシック"/>
@@ -4245,7 +4271,7 @@
         <a:font script="Geor" typeface="Sylfaen"/>
       </a:majorFont>
       <a:minorFont>
-        <a:latin typeface="Calibri" panose="020F0502020204030204"/>
+        <a:latin typeface="Calibri"/>
         <a:ea typeface=""/>
         <a:cs typeface=""/>
         <a:font script="Jpan" typeface="ＭＳ Ｐゴシック"/>
@@ -4422,7 +4448,7 @@
   <a:extraClrSchemeLst/>
   <a:extLst>
     <a:ext uri="{05A4C25C-085E-4340-85A3-A5531E510DB2}">
-      <thm15:themeFamily xmlns:thm15="http://schemas.microsoft.com/office/thememl/2012/main" name="Office Theme" id="{62F939B6-93AF-4DB8-9C6B-D6C7DFDC589F}" vid="{4A3C46E8-61CC-4603-A589-7422A47A8E4A}"/>
+      <thm15:themeFamily xmlns:thm15="http://schemas.microsoft.com/office/thememl/2012/main" xmlns="" name="Office Theme" id="{62F939B6-93AF-4DB8-9C6B-D6C7DFDC589F}" vid="{4A3C46E8-61CC-4603-A589-7422A47A8E4A}"/>
     </a:ext>
   </a:extLst>
 </a:theme>

</xml_diff>